<commit_message>
füge Literatur und Hausarbeit hin
</commit_message>
<xml_diff>
--- a/Präsentation/pspohr - SLIFI Abschlusspräsentation 23Jan2024.pptx
+++ b/Präsentation/pspohr - SLIFI Abschlusspräsentation 23Jan2024.pptx
@@ -2105,7 +2105,7 @@
   <pc:docChgLst>
     <pc:chgData name="Patrick Spohr" userId="52d4397b1069a9aa" providerId="LiveId" clId="{5FB87676-0D6E-4C42-AF8E-7F6E4C1E0218}"/>
     <pc:docChg chg="undo redo custSel addSld delSld modSld sldOrd modMainMaster">
-      <pc:chgData name="Patrick Spohr" userId="52d4397b1069a9aa" providerId="LiveId" clId="{5FB87676-0D6E-4C42-AF8E-7F6E4C1E0218}" dt="2024-01-22T14:23:15.798" v="9932" actId="20577"/>
+      <pc:chgData name="Patrick Spohr" userId="52d4397b1069a9aa" providerId="LiveId" clId="{5FB87676-0D6E-4C42-AF8E-7F6E4C1E0218}" dt="2024-01-23T10:34:42.829" v="9936" actId="20577"/>
       <pc:docMkLst>
         <pc:docMk/>
       </pc:docMkLst>
@@ -3042,13 +3042,13 @@
         </pc:picChg>
       </pc:sldChg>
       <pc:sldChg chg="addSp modSp mod">
-        <pc:chgData name="Patrick Spohr" userId="52d4397b1069a9aa" providerId="LiveId" clId="{5FB87676-0D6E-4C42-AF8E-7F6E4C1E0218}" dt="2024-01-22T13:29:23.722" v="9759" actId="14100"/>
+        <pc:chgData name="Patrick Spohr" userId="52d4397b1069a9aa" providerId="LiveId" clId="{5FB87676-0D6E-4C42-AF8E-7F6E4C1E0218}" dt="2024-01-23T10:34:36.702" v="9934" actId="20577"/>
         <pc:sldMkLst>
           <pc:docMk/>
           <pc:sldMk cId="675902136" sldId="284"/>
         </pc:sldMkLst>
         <pc:spChg chg="mod">
-          <ac:chgData name="Patrick Spohr" userId="52d4397b1069a9aa" providerId="LiveId" clId="{5FB87676-0D6E-4C42-AF8E-7F6E4C1E0218}" dt="2024-01-22T13:27:39.182" v="9741" actId="1076"/>
+          <ac:chgData name="Patrick Spohr" userId="52d4397b1069a9aa" providerId="LiveId" clId="{5FB87676-0D6E-4C42-AF8E-7F6E4C1E0218}" dt="2024-01-23T10:34:36.702" v="9934" actId="20577"/>
           <ac:spMkLst>
             <pc:docMk/>
             <pc:sldMk cId="675902136" sldId="284"/>
@@ -4082,13 +4082,13 @@
         </pc:picChg>
       </pc:sldChg>
       <pc:sldChg chg="addSp modSp add mod">
-        <pc:chgData name="Patrick Spohr" userId="52d4397b1069a9aa" providerId="LiveId" clId="{5FB87676-0D6E-4C42-AF8E-7F6E4C1E0218}" dt="2024-01-22T13:28:41.381" v="9754" actId="1076"/>
+        <pc:chgData name="Patrick Spohr" userId="52d4397b1069a9aa" providerId="LiveId" clId="{5FB87676-0D6E-4C42-AF8E-7F6E4C1E0218}" dt="2024-01-23T10:34:42.829" v="9936" actId="20577"/>
         <pc:sldMkLst>
           <pc:docMk/>
           <pc:sldMk cId="561964301" sldId="291"/>
         </pc:sldMkLst>
         <pc:spChg chg="mod">
-          <ac:chgData name="Patrick Spohr" userId="52d4397b1069a9aa" providerId="LiveId" clId="{5FB87676-0D6E-4C42-AF8E-7F6E4C1E0218}" dt="2024-01-22T13:28:28.898" v="9749" actId="1076"/>
+          <ac:chgData name="Patrick Spohr" userId="52d4397b1069a9aa" providerId="LiveId" clId="{5FB87676-0D6E-4C42-AF8E-7F6E4C1E0218}" dt="2024-01-23T10:34:42.829" v="9936" actId="20577"/>
           <ac:spMkLst>
             <pc:docMk/>
             <pc:sldMk cId="561964301" sldId="291"/>
@@ -7992,7 +7992,7 @@
           <a:p>
             <a:fld id="{B56F32FC-4BD9-442A-A8C6-51598C909FE3}" type="datetimeFigureOut">
               <a:rPr lang="en-US" smtClean="0"/>
-              <a:t>1/22/2024</a:t>
+              <a:t>1/23/2024</a:t>
             </a:fld>
             <a:endParaRPr lang="en-US" dirty="0"/>
           </a:p>
@@ -8169,7 +8169,7 @@
           <a:p>
             <a:fld id="{056371FA-A98D-41E8-93F4-09945841298A}" type="datetimeFigureOut">
               <a:rPr lang="en-US" smtClean="0"/>
-              <a:t>1/22/2024</a:t>
+              <a:t>1/23/2024</a:t>
             </a:fld>
             <a:endParaRPr lang="en-US" dirty="0"/>
           </a:p>
@@ -30819,7 +30819,7 @@
           <a:p>
             <a:r>
               <a:rPr lang="de-DE" dirty="0"/>
-              <a:t>N Aktien mit x Close Preis</a:t>
+              <a:t>A Aktien mit x Close Preis</a:t>
             </a:r>
           </a:p>
         </p:txBody>
@@ -31263,7 +31263,7 @@
           <a:p>
             <a:r>
               <a:rPr lang="de-DE" dirty="0"/>
-              <a:t>N Aktien mit x Close Preis</a:t>
+              <a:t>A Aktien mit x Close Preis</a:t>
             </a:r>
           </a:p>
         </p:txBody>
@@ -44970,6 +44970,35 @@
 </file>
 
 <file path=customXml/item1.xml><?xml version="1.0" encoding="utf-8"?>
+<?mso-contentType ?>
+<FormTemplates xmlns="http://schemas.microsoft.com/sharepoint/v3/contenttype/forms">
+  <Display>DocumentLibraryForm</Display>
+  <Edit>DocumentLibraryForm</Edit>
+  <New>DocumentLibraryForm</New>
+</FormTemplates>
+</file>
+
+<file path=customXml/item2.xml><?xml version="1.0" encoding="utf-8"?>
+<p:properties xmlns:p="http://schemas.microsoft.com/office/2006/metadata/properties" xmlns:xsi="http://www.w3.org/2001/XMLSchema-instance" xmlns:pc="http://schemas.microsoft.com/office/infopath/2007/PartnerControls">
+  <documentManagement>
+    <_ip_UnifiedCompliancePolicyUIAction xmlns="http://schemas.microsoft.com/sharepoint/v3" xsi:nil="true"/>
+    <Image xmlns="71af3243-3dd4-4a8d-8c0d-dd76da1f02a5">
+      <Url xsi:nil="true"/>
+      <Description xsi:nil="true"/>
+    </Image>
+    <Status xmlns="71af3243-3dd4-4a8d-8c0d-dd76da1f02a5">Not started</Status>
+    <_ip_UnifiedCompliancePolicyProperties xmlns="http://schemas.microsoft.com/sharepoint/v3" xsi:nil="true"/>
+    <ImageTagsTaxHTField xmlns="71af3243-3dd4-4a8d-8c0d-dd76da1f02a5">
+      <Terms xmlns="http://schemas.microsoft.com/office/infopath/2007/PartnerControls"/>
+    </ImageTagsTaxHTField>
+    <TaxCatchAll xmlns="230e9df3-be65-4c73-a93b-d1236ebd677e" xsi:nil="true"/>
+    <MediaServiceKeyPoints xmlns="71af3243-3dd4-4a8d-8c0d-dd76da1f02a5" xsi:nil="true"/>
+    <Background xmlns="71af3243-3dd4-4a8d-8c0d-dd76da1f02a5">false</Background>
+  </documentManagement>
+</p:properties>
+</file>
+
+<file path=customXml/item3.xml><?xml version="1.0" encoding="utf-8"?>
 <ct:contentTypeSchema xmlns:ct="http://schemas.microsoft.com/office/2006/metadata/contentType" xmlns:ma="http://schemas.microsoft.com/office/2006/metadata/properties/metaAttributes" ct:_="" ma:_="" ma:contentTypeName="Document" ma:contentTypeID="0x01010079F111ED35F8CC479449609E8A0923A6" ma:contentTypeVersion="28" ma:contentTypeDescription="Create a new document." ma:contentTypeScope="" ma:versionID="60f5a4f2d2b0abadcf532d48ebf9cb71">
   <xsd:schema xmlns:xsd="http://www.w3.org/2001/XMLSchema" xmlns:xs="http://www.w3.org/2001/XMLSchema" xmlns:p="http://schemas.microsoft.com/office/2006/metadata/properties" xmlns:ns1="http://schemas.microsoft.com/sharepoint/v3" xmlns:ns2="71af3243-3dd4-4a8d-8c0d-dd76da1f02a5" xmlns:ns3="16c05727-aa75-4e4a-9b5f-8a80a1165891" xmlns:ns4="230e9df3-be65-4c73-a93b-d1236ebd677e" targetNamespace="http://schemas.microsoft.com/office/2006/metadata/properties" ma:root="true" ma:fieldsID="7dd78129e6a1811f84807ad11c651531" ns1:_="" ns2:_="" ns3:_="" ns4:_="">
     <xsd:import namespace="http://schemas.microsoft.com/sharepoint/v3"/>
@@ -45281,36 +45310,27 @@
 </ct:contentTypeSchema>
 </file>
 
-<file path=customXml/item2.xml><?xml version="1.0" encoding="utf-8"?>
-<?mso-contentType ?>
-<FormTemplates xmlns="http://schemas.microsoft.com/sharepoint/v3/contenttype/forms">
-  <Display>DocumentLibraryForm</Display>
-  <Edit>DocumentLibraryForm</Edit>
-  <New>DocumentLibraryForm</New>
-</FormTemplates>
+<file path=customXml/itemProps1.xml><?xml version="1.0" encoding="utf-8"?>
+<ds:datastoreItem xmlns:ds="http://schemas.openxmlformats.org/officeDocument/2006/customXml" ds:itemID="{BD5826B4-4DD2-4A9B-8D6D-E91CF9C2316C}">
+  <ds:schemaRefs>
+    <ds:schemaRef ds:uri="http://schemas.microsoft.com/sharepoint/v3/contenttype/forms"/>
+  </ds:schemaRefs>
+</ds:datastoreItem>
 </file>
 
-<file path=customXml/item3.xml><?xml version="1.0" encoding="utf-8"?>
-<p:properties xmlns:p="http://schemas.microsoft.com/office/2006/metadata/properties" xmlns:xsi="http://www.w3.org/2001/XMLSchema-instance" xmlns:pc="http://schemas.microsoft.com/office/infopath/2007/PartnerControls">
-  <documentManagement>
-    <_ip_UnifiedCompliancePolicyUIAction xmlns="http://schemas.microsoft.com/sharepoint/v3" xsi:nil="true"/>
-    <Image xmlns="71af3243-3dd4-4a8d-8c0d-dd76da1f02a5">
-      <Url xsi:nil="true"/>
-      <Description xsi:nil="true"/>
-    </Image>
-    <Status xmlns="71af3243-3dd4-4a8d-8c0d-dd76da1f02a5">Not started</Status>
-    <_ip_UnifiedCompliancePolicyProperties xmlns="http://schemas.microsoft.com/sharepoint/v3" xsi:nil="true"/>
-    <ImageTagsTaxHTField xmlns="71af3243-3dd4-4a8d-8c0d-dd76da1f02a5">
-      <Terms xmlns="http://schemas.microsoft.com/office/infopath/2007/PartnerControls"/>
-    </ImageTagsTaxHTField>
-    <TaxCatchAll xmlns="230e9df3-be65-4c73-a93b-d1236ebd677e" xsi:nil="true"/>
-    <MediaServiceKeyPoints xmlns="71af3243-3dd4-4a8d-8c0d-dd76da1f02a5" xsi:nil="true"/>
-    <Background xmlns="71af3243-3dd4-4a8d-8c0d-dd76da1f02a5">false</Background>
-  </documentManagement>
-</p:properties>
+<file path=customXml/itemProps2.xml><?xml version="1.0" encoding="utf-8"?>
+<ds:datastoreItem xmlns:ds="http://schemas.openxmlformats.org/officeDocument/2006/customXml" ds:itemID="{4CC7F809-A434-4A8D-A127-1C50C2DB3890}">
+  <ds:schemaRefs>
+    <ds:schemaRef ds:uri="http://schemas.microsoft.com/office/2006/metadata/properties"/>
+    <ds:schemaRef ds:uri="http://schemas.microsoft.com/office/infopath/2007/PartnerControls"/>
+    <ds:schemaRef ds:uri="http://schemas.microsoft.com/sharepoint/v3"/>
+    <ds:schemaRef ds:uri="71af3243-3dd4-4a8d-8c0d-dd76da1f02a5"/>
+    <ds:schemaRef ds:uri="230e9df3-be65-4c73-a93b-d1236ebd677e"/>
+  </ds:schemaRefs>
+</ds:datastoreItem>
 </file>
 
-<file path=customXml/itemProps1.xml><?xml version="1.0" encoding="utf-8"?>
+<file path=customXml/itemProps3.xml><?xml version="1.0" encoding="utf-8"?>
 <ds:datastoreItem xmlns:ds="http://schemas.openxmlformats.org/officeDocument/2006/customXml" ds:itemID="{00E6EE1E-660B-46C6-AC21-8E505FB9574F}">
   <ds:schemaRefs>
     <ds:schemaRef ds:uri="http://schemas.microsoft.com/office/2006/metadata/contentType"/>
@@ -45331,26 +45351,6 @@
 </ds:datastoreItem>
 </file>
 
-<file path=customXml/itemProps2.xml><?xml version="1.0" encoding="utf-8"?>
-<ds:datastoreItem xmlns:ds="http://schemas.openxmlformats.org/officeDocument/2006/customXml" ds:itemID="{BD5826B4-4DD2-4A9B-8D6D-E91CF9C2316C}">
-  <ds:schemaRefs>
-    <ds:schemaRef ds:uri="http://schemas.microsoft.com/sharepoint/v3/contenttype/forms"/>
-  </ds:schemaRefs>
-</ds:datastoreItem>
-</file>
-
-<file path=customXml/itemProps3.xml><?xml version="1.0" encoding="utf-8"?>
-<ds:datastoreItem xmlns:ds="http://schemas.openxmlformats.org/officeDocument/2006/customXml" ds:itemID="{4CC7F809-A434-4A8D-A127-1C50C2DB3890}">
-  <ds:schemaRefs>
-    <ds:schemaRef ds:uri="http://schemas.microsoft.com/office/2006/metadata/properties"/>
-    <ds:schemaRef ds:uri="http://schemas.microsoft.com/office/infopath/2007/PartnerControls"/>
-    <ds:schemaRef ds:uri="http://schemas.microsoft.com/sharepoint/v3"/>
-    <ds:schemaRef ds:uri="71af3243-3dd4-4a8d-8c0d-dd76da1f02a5"/>
-    <ds:schemaRef ds:uri="230e9df3-be65-4c73-a93b-d1236ebd677e"/>
-  </ds:schemaRefs>
-</ds:datastoreItem>
-</file>
-
 <file path=docMetadata/LabelInfo.xml><?xml version="1.0" encoding="utf-8"?>
 <clbl:labelList xmlns:clbl="http://schemas.microsoft.com/office/2020/mipLabelMetadata"/>
 </file>
</xml_diff>

<commit_message>
schreibe Hausarbeit in LaTeX
</commit_message>
<xml_diff>
--- a/Präsentation/pspohr - SLIFI Abschlusspräsentation 23Jan2024.pptx
+++ b/Präsentation/pspohr - SLIFI Abschlusspräsentation 23Jan2024.pptx
@@ -2105,7 +2105,7 @@
   <pc:docChgLst>
     <pc:chgData name="Patrick Spohr" userId="52d4397b1069a9aa" providerId="LiveId" clId="{5FB87676-0D6E-4C42-AF8E-7F6E4C1E0218}"/>
     <pc:docChg chg="undo redo custSel addSld delSld modSld sldOrd modMainMaster">
-      <pc:chgData name="Patrick Spohr" userId="52d4397b1069a9aa" providerId="LiveId" clId="{5FB87676-0D6E-4C42-AF8E-7F6E4C1E0218}" dt="2024-01-23T10:34:42.829" v="9936" actId="20577"/>
+      <pc:chgData name="Patrick Spohr" userId="52d4397b1069a9aa" providerId="LiveId" clId="{5FB87676-0D6E-4C42-AF8E-7F6E4C1E0218}" dt="2024-02-02T15:54:15.463" v="9937" actId="1076"/>
       <pc:docMkLst>
         <pc:docMk/>
       </pc:docMkLst>
@@ -5620,7 +5620,7 @@
         </pc:sldMkLst>
       </pc:sldChg>
       <pc:sldChg chg="addSp delSp modSp add mod">
-        <pc:chgData name="Patrick Spohr" userId="52d4397b1069a9aa" providerId="LiveId" clId="{5FB87676-0D6E-4C42-AF8E-7F6E4C1E0218}" dt="2024-01-22T11:07:23.929" v="8935" actId="1076"/>
+        <pc:chgData name="Patrick Spohr" userId="52d4397b1069a9aa" providerId="LiveId" clId="{5FB87676-0D6E-4C42-AF8E-7F6E4C1E0218}" dt="2024-02-02T15:54:15.463" v="9937" actId="1076"/>
         <pc:sldMkLst>
           <pc:docMk/>
           <pc:sldMk cId="3973006410" sldId="304"/>
@@ -5690,7 +5690,7 @@
           </ac:spMkLst>
         </pc:spChg>
         <pc:spChg chg="add mod">
-          <ac:chgData name="Patrick Spohr" userId="52d4397b1069a9aa" providerId="LiveId" clId="{5FB87676-0D6E-4C42-AF8E-7F6E4C1E0218}" dt="2024-01-21T16:03:44.685" v="4608" actId="1076"/>
+          <ac:chgData name="Patrick Spohr" userId="52d4397b1069a9aa" providerId="LiveId" clId="{5FB87676-0D6E-4C42-AF8E-7F6E4C1E0218}" dt="2024-02-02T15:54:15.463" v="9937" actId="1076"/>
           <ac:spMkLst>
             <pc:docMk/>
             <pc:sldMk cId="3973006410" sldId="304"/>
@@ -7992,7 +7992,7 @@
           <a:p>
             <a:fld id="{B56F32FC-4BD9-442A-A8C6-51598C909FE3}" type="datetimeFigureOut">
               <a:rPr lang="en-US" smtClean="0"/>
-              <a:t>1/23/2024</a:t>
+              <a:t>2/2/2024</a:t>
             </a:fld>
             <a:endParaRPr lang="en-US" dirty="0"/>
           </a:p>
@@ -8169,7 +8169,7 @@
           <a:p>
             <a:fld id="{056371FA-A98D-41E8-93F4-09945841298A}" type="datetimeFigureOut">
               <a:rPr lang="en-US" smtClean="0"/>
-              <a:t>1/23/2024</a:t>
+              <a:t>2/2/2024</a:t>
             </a:fld>
             <a:endParaRPr lang="en-US" dirty="0"/>
           </a:p>
@@ -28384,8 +28384,8 @@
           </a:p>
         </p:txBody>
       </p:sp>
-      <mc:AlternateContent xmlns:mc="http://schemas.openxmlformats.org/markup-compatibility/2006" xmlns:a14="http://schemas.microsoft.com/office/drawing/2010/main">
-        <mc:Choice Requires="a14">
+      <mc:AlternateContent xmlns:mc="http://schemas.openxmlformats.org/markup-compatibility/2006">
+        <mc:Choice xmlns:a14="http://schemas.microsoft.com/office/drawing/2010/main" Requires="a14">
           <p:sp>
             <p:nvSpPr>
               <p:cNvPr id="19" name="TextBox 18">
@@ -28400,7 +28400,7 @@
             </p:nvSpPr>
             <p:spPr>
               <a:xfrm>
-                <a:off x="4838374" y="1299387"/>
+                <a:off x="4783768" y="1217934"/>
                 <a:ext cx="3176912" cy="1051057"/>
               </a:xfrm>
               <a:prstGeom prst="rect">
@@ -28639,7 +28639,7 @@
             </p:txBody>
           </p:sp>
         </mc:Choice>
-        <mc:Fallback xmlns="">
+        <mc:Fallback>
           <p:sp>
             <p:nvSpPr>
               <p:cNvPr id="19" name="TextBox 18">
@@ -28656,7 +28656,7 @@
             </p:nvSpPr>
             <p:spPr>
               <a:xfrm>
-                <a:off x="4838374" y="1299387"/>
+                <a:off x="4783768" y="1217934"/>
                 <a:ext cx="3176912" cy="1051057"/>
               </a:xfrm>
               <a:prstGeom prst="rect">
@@ -44970,15 +44970,6 @@
 </file>
 
 <file path=customXml/item1.xml><?xml version="1.0" encoding="utf-8"?>
-<?mso-contentType ?>
-<FormTemplates xmlns="http://schemas.microsoft.com/sharepoint/v3/contenttype/forms">
-  <Display>DocumentLibraryForm</Display>
-  <Edit>DocumentLibraryForm</Edit>
-  <New>DocumentLibraryForm</New>
-</FormTemplates>
-</file>
-
-<file path=customXml/item2.xml><?xml version="1.0" encoding="utf-8"?>
 <p:properties xmlns:p="http://schemas.microsoft.com/office/2006/metadata/properties" xmlns:xsi="http://www.w3.org/2001/XMLSchema-instance" xmlns:pc="http://schemas.microsoft.com/office/infopath/2007/PartnerControls">
   <documentManagement>
     <_ip_UnifiedCompliancePolicyUIAction xmlns="http://schemas.microsoft.com/sharepoint/v3" xsi:nil="true"/>
@@ -44998,7 +44989,7 @@
 </p:properties>
 </file>
 
-<file path=customXml/item3.xml><?xml version="1.0" encoding="utf-8"?>
+<file path=customXml/item2.xml><?xml version="1.0" encoding="utf-8"?>
 <ct:contentTypeSchema xmlns:ct="http://schemas.microsoft.com/office/2006/metadata/contentType" xmlns:ma="http://schemas.microsoft.com/office/2006/metadata/properties/metaAttributes" ct:_="" ma:_="" ma:contentTypeName="Document" ma:contentTypeID="0x01010079F111ED35F8CC479449609E8A0923A6" ma:contentTypeVersion="28" ma:contentTypeDescription="Create a new document." ma:contentTypeScope="" ma:versionID="60f5a4f2d2b0abadcf532d48ebf9cb71">
   <xsd:schema xmlns:xsd="http://www.w3.org/2001/XMLSchema" xmlns:xs="http://www.w3.org/2001/XMLSchema" xmlns:p="http://schemas.microsoft.com/office/2006/metadata/properties" xmlns:ns1="http://schemas.microsoft.com/sharepoint/v3" xmlns:ns2="71af3243-3dd4-4a8d-8c0d-dd76da1f02a5" xmlns:ns3="16c05727-aa75-4e4a-9b5f-8a80a1165891" xmlns:ns4="230e9df3-be65-4c73-a93b-d1236ebd677e" targetNamespace="http://schemas.microsoft.com/office/2006/metadata/properties" ma:root="true" ma:fieldsID="7dd78129e6a1811f84807ad11c651531" ns1:_="" ns2:_="" ns3:_="" ns4:_="">
     <xsd:import namespace="http://schemas.microsoft.com/sharepoint/v3"/>
@@ -45310,15 +45301,16 @@
 </ct:contentTypeSchema>
 </file>
 
-<file path=customXml/itemProps1.xml><?xml version="1.0" encoding="utf-8"?>
-<ds:datastoreItem xmlns:ds="http://schemas.openxmlformats.org/officeDocument/2006/customXml" ds:itemID="{BD5826B4-4DD2-4A9B-8D6D-E91CF9C2316C}">
-  <ds:schemaRefs>
-    <ds:schemaRef ds:uri="http://schemas.microsoft.com/sharepoint/v3/contenttype/forms"/>
-  </ds:schemaRefs>
-</ds:datastoreItem>
+<file path=customXml/item3.xml><?xml version="1.0" encoding="utf-8"?>
+<?mso-contentType ?>
+<FormTemplates xmlns="http://schemas.microsoft.com/sharepoint/v3/contenttype/forms">
+  <Display>DocumentLibraryForm</Display>
+  <Edit>DocumentLibraryForm</Edit>
+  <New>DocumentLibraryForm</New>
+</FormTemplates>
 </file>
 
-<file path=customXml/itemProps2.xml><?xml version="1.0" encoding="utf-8"?>
+<file path=customXml/itemProps1.xml><?xml version="1.0" encoding="utf-8"?>
 <ds:datastoreItem xmlns:ds="http://schemas.openxmlformats.org/officeDocument/2006/customXml" ds:itemID="{4CC7F809-A434-4A8D-A127-1C50C2DB3890}">
   <ds:schemaRefs>
     <ds:schemaRef ds:uri="http://schemas.microsoft.com/office/2006/metadata/properties"/>
@@ -45330,7 +45322,7 @@
 </ds:datastoreItem>
 </file>
 
-<file path=customXml/itemProps3.xml><?xml version="1.0" encoding="utf-8"?>
+<file path=customXml/itemProps2.xml><?xml version="1.0" encoding="utf-8"?>
 <ds:datastoreItem xmlns:ds="http://schemas.openxmlformats.org/officeDocument/2006/customXml" ds:itemID="{00E6EE1E-660B-46C6-AC21-8E505FB9574F}">
   <ds:schemaRefs>
     <ds:schemaRef ds:uri="http://schemas.microsoft.com/office/2006/metadata/contentType"/>
@@ -45351,6 +45343,14 @@
 </ds:datastoreItem>
 </file>
 
+<file path=customXml/itemProps3.xml><?xml version="1.0" encoding="utf-8"?>
+<ds:datastoreItem xmlns:ds="http://schemas.openxmlformats.org/officeDocument/2006/customXml" ds:itemID="{BD5826B4-4DD2-4A9B-8D6D-E91CF9C2316C}">
+  <ds:schemaRefs>
+    <ds:schemaRef ds:uri="http://schemas.microsoft.com/sharepoint/v3/contenttype/forms"/>
+  </ds:schemaRefs>
+</ds:datastoreItem>
+</file>
+
 <file path=docMetadata/LabelInfo.xml><?xml version="1.0" encoding="utf-8"?>
 <clbl:labelList xmlns:clbl="http://schemas.microsoft.com/office/2020/mipLabelMetadata"/>
 </file>
</xml_diff>